<commit_message>
Revisão para a avaliação
</commit_message>
<xml_diff>
--- a/Portugol/Revisão para prova - Portugol.pptx
+++ b/Portugol/Revisão para prova - Portugol.pptx
@@ -13,8 +13,8 @@
     <p:sldId id="261" r:id="rId7"/>
     <p:sldId id="262" r:id="rId8"/>
     <p:sldId id="263" r:id="rId9"/>
-    <p:sldId id="265" r:id="rId10"/>
-    <p:sldId id="273" r:id="rId11"/>
+    <p:sldId id="273" r:id="rId10"/>
+    <p:sldId id="265" r:id="rId11"/>
     <p:sldId id="266" r:id="rId12"/>
     <p:sldId id="267" r:id="rId13"/>
     <p:sldId id="268" r:id="rId14"/>
@@ -6123,6 +6123,7 @@
           <a:bodyPr/>
           <a:lstStyle/>
           <a:p>
+            <a:pPr algn="just"/>
             <a:r>
               <a:rPr lang="pt-BR" sz="3900" dirty="0" smtClean="0"/>
               <a:t>Declaração de variáveis e constantes</a:t>
@@ -6143,8 +6144,8 @@
         </p:nvSpPr>
         <p:spPr>
           <a:xfrm>
-            <a:off x="1103312" y="2052918"/>
-            <a:ext cx="10005966" cy="4195481"/>
+            <a:off x="1103312" y="1514902"/>
+            <a:ext cx="10060557" cy="4733498"/>
           </a:xfrm>
         </p:spPr>
         <p:txBody>
@@ -6154,38 +6155,263 @@
             <a:pPr algn="just"/>
             <a:r>
               <a:rPr lang="pt-BR" sz="1800" dirty="0" smtClean="0"/>
-              <a:t>Antes de escrevermos as variáveis e constantes é preciso entender a diferença entre uma e outra.</a:t>
+              <a:t>Para definir uma variável, primeiro é preciso definir qual o </a:t>
+            </a:r>
+            <a:r>
+              <a:rPr lang="pt-BR" sz="1800" b="1" u="sng" dirty="0" smtClean="0"/>
+              <a:t>tipo de dado</a:t>
+            </a:r>
+            <a:r>
+              <a:rPr lang="pt-BR" sz="1800" b="1" dirty="0" smtClean="0"/>
+              <a:t> </a:t>
+            </a:r>
+            <a:r>
+              <a:rPr lang="pt-BR" sz="1800" dirty="0" smtClean="0"/>
+              <a:t>vai ser armazenado e um </a:t>
+            </a:r>
+            <a:r>
+              <a:rPr lang="pt-BR" sz="1800" b="1" u="sng" dirty="0" smtClean="0"/>
+              <a:t>nome para a variável</a:t>
+            </a:r>
+            <a:r>
+              <a:rPr lang="pt-BR" sz="1800" dirty="0" smtClean="0"/>
+              <a:t>, sempre seguindo aquelas regras de quais caracteres usar e não usar e números também</a:t>
+            </a:r>
+          </a:p>
+          <a:p>
+            <a:pPr lvl="1"/>
+            <a:r>
+              <a:rPr lang="pt-BR" dirty="0" smtClean="0"/>
+              <a:t>Exemplo: </a:t>
+            </a:r>
+            <a:r>
+              <a:rPr lang="pt-BR" sz="2400" b="1" dirty="0" smtClean="0"/>
+              <a:t>cadeia nome_funcionario</a:t>
+            </a:r>
+          </a:p>
+          <a:p>
+            <a:pPr marL="457200" lvl="1" indent="0">
+              <a:buNone/>
+            </a:pPr>
+            <a:endParaRPr lang="pt-BR" sz="2400" b="1" dirty="0"/>
+          </a:p>
+          <a:p>
+            <a:pPr marL="457200" lvl="1" indent="0">
+              <a:buNone/>
+            </a:pPr>
+            <a:r>
+              <a:rPr lang="pt-BR" sz="2400" b="1" dirty="0" smtClean="0"/>
+              <a:t>			   Tipo		Nome da variável</a:t>
             </a:r>
           </a:p>
           <a:p>
             <a:pPr algn="just"/>
+            <a:r>
+              <a:rPr lang="pt-BR" sz="1600" dirty="0" smtClean="0"/>
+              <a:t>Se houver mais de uma variável com o mesmo tipo de dado, podemos colocar uma virgula e escrever o nome das outras variáveis em seguida.</a:t>
+            </a:r>
+          </a:p>
+          <a:p>
+            <a:pPr lvl="1"/>
+            <a:r>
+              <a:rPr lang="pt-BR" dirty="0" smtClean="0"/>
+              <a:t>Exemplo: </a:t>
+            </a:r>
+            <a:r>
+              <a:rPr lang="pt-BR" sz="2400" b="1" dirty="0" smtClean="0"/>
+              <a:t>real nota1, nota2, nota3, media</a:t>
+            </a:r>
+          </a:p>
+          <a:p>
+            <a:pPr marL="457200" lvl="1" indent="0">
+              <a:buNone/>
+            </a:pPr>
+            <a:endParaRPr lang="pt-BR" sz="900" b="1" dirty="0" smtClean="0"/>
+          </a:p>
+          <a:p>
+            <a:pPr marL="457200" lvl="1" indent="0">
+              <a:buNone/>
+            </a:pPr>
+            <a:r>
+              <a:rPr lang="pt-BR" sz="2400" b="1" dirty="0" smtClean="0"/>
+              <a:t>			Tipo		Nome das variáveis</a:t>
+            </a:r>
             <a:endParaRPr lang="pt-BR" dirty="0"/>
           </a:p>
-          <a:p>
-            <a:pPr lvl="1" algn="just"/>
-            <a:r>
-              <a:rPr lang="pt-BR" dirty="0" smtClean="0"/>
-              <a:t>Variáveis armazenam dados que podem sofrer alguma alteração durante na estrutura do código.</a:t>
-            </a:r>
-          </a:p>
-          <a:p>
-            <a:pPr lvl="1" algn="just"/>
-            <a:endParaRPr lang="pt-BR" dirty="0"/>
-          </a:p>
-          <a:p>
-            <a:pPr lvl="1" algn="just"/>
-            <a:r>
-              <a:rPr lang="pt-BR" dirty="0" smtClean="0"/>
-              <a:t>Constantes armazenam dados fixos, ou seja, esses dados não podem ser alterados estrutura do código.</a:t>
-            </a:r>
-            <a:endParaRPr lang="pt-BR" dirty="0"/>
+        </p:txBody>
+      </p:sp>
+      <p:sp>
+        <p:nvSpPr>
+          <p:cNvPr id="4" name="Chave Esquerda 3"/>
+          <p:cNvSpPr/>
+          <p:nvPr/>
+        </p:nvSpPr>
+        <p:spPr>
+          <a:xfrm rot="16200000">
+            <a:off x="3288309" y="2683419"/>
+            <a:ext cx="504967" cy="968992"/>
+          </a:xfrm>
+          <a:prstGeom prst="leftBrace">
+            <a:avLst>
+              <a:gd name="adj1" fmla="val 35360"/>
+              <a:gd name="adj2" fmla="val 50000"/>
+            </a:avLst>
+          </a:prstGeom>
+          <a:ln w="38100"/>
+        </p:spPr>
+        <p:style>
+          <a:lnRef idx="1">
+            <a:schemeClr val="accent2"/>
+          </a:lnRef>
+          <a:fillRef idx="0">
+            <a:schemeClr val="accent2"/>
+          </a:fillRef>
+          <a:effectRef idx="0">
+            <a:schemeClr val="accent2"/>
+          </a:effectRef>
+          <a:fontRef idx="minor">
+            <a:schemeClr val="tx1"/>
+          </a:fontRef>
+        </p:style>
+        <p:txBody>
+          <a:bodyPr rtlCol="0" anchor="ctr"/>
+          <a:lstStyle/>
+          <a:p>
+            <a:pPr algn="ctr"/>
+            <a:endParaRPr lang="pt-BR"/>
+          </a:p>
+        </p:txBody>
+      </p:sp>
+      <p:sp>
+        <p:nvSpPr>
+          <p:cNvPr id="5" name="Chave Esquerda 4"/>
+          <p:cNvSpPr/>
+          <p:nvPr/>
+        </p:nvSpPr>
+        <p:spPr>
+          <a:xfrm rot="16200000">
+            <a:off x="5247841" y="1838396"/>
+            <a:ext cx="504967" cy="2659039"/>
+          </a:xfrm>
+          <a:prstGeom prst="leftBrace">
+            <a:avLst>
+              <a:gd name="adj1" fmla="val 35360"/>
+              <a:gd name="adj2" fmla="val 50513"/>
+            </a:avLst>
+          </a:prstGeom>
+          <a:ln w="38100"/>
+        </p:spPr>
+        <p:style>
+          <a:lnRef idx="1">
+            <a:schemeClr val="accent1"/>
+          </a:lnRef>
+          <a:fillRef idx="0">
+            <a:schemeClr val="accent1"/>
+          </a:fillRef>
+          <a:effectRef idx="0">
+            <a:schemeClr val="accent1"/>
+          </a:effectRef>
+          <a:fontRef idx="minor">
+            <a:schemeClr val="tx1"/>
+          </a:fontRef>
+        </p:style>
+        <p:txBody>
+          <a:bodyPr rtlCol="0" anchor="ctr"/>
+          <a:lstStyle/>
+          <a:p>
+            <a:pPr algn="ctr"/>
+            <a:endParaRPr lang="pt-BR"/>
+          </a:p>
+        </p:txBody>
+      </p:sp>
+      <p:sp>
+        <p:nvSpPr>
+          <p:cNvPr id="6" name="Chave Esquerda 5"/>
+          <p:cNvSpPr/>
+          <p:nvPr/>
+        </p:nvSpPr>
+        <p:spPr>
+          <a:xfrm rot="16200000">
+            <a:off x="3153686" y="4838977"/>
+            <a:ext cx="316440" cy="592946"/>
+          </a:xfrm>
+          <a:prstGeom prst="leftBrace">
+            <a:avLst>
+              <a:gd name="adj1" fmla="val 35360"/>
+              <a:gd name="adj2" fmla="val 50000"/>
+            </a:avLst>
+          </a:prstGeom>
+          <a:ln w="38100"/>
+        </p:spPr>
+        <p:style>
+          <a:lnRef idx="1">
+            <a:schemeClr val="accent2"/>
+          </a:lnRef>
+          <a:fillRef idx="0">
+            <a:schemeClr val="accent2"/>
+          </a:fillRef>
+          <a:effectRef idx="0">
+            <a:schemeClr val="accent2"/>
+          </a:effectRef>
+          <a:fontRef idx="minor">
+            <a:schemeClr val="tx1"/>
+          </a:fontRef>
+        </p:style>
+        <p:txBody>
+          <a:bodyPr rtlCol="0" anchor="ctr"/>
+          <a:lstStyle/>
+          <a:p>
+            <a:pPr algn="ctr"/>
+            <a:endParaRPr lang="pt-BR"/>
+          </a:p>
+        </p:txBody>
+      </p:sp>
+      <p:sp>
+        <p:nvSpPr>
+          <p:cNvPr id="7" name="Chave Esquerda 6"/>
+          <p:cNvSpPr/>
+          <p:nvPr/>
+        </p:nvSpPr>
+        <p:spPr>
+          <a:xfrm rot="16200000">
+            <a:off x="5485375" y="3151148"/>
+            <a:ext cx="316441" cy="3968603"/>
+          </a:xfrm>
+          <a:prstGeom prst="leftBrace">
+            <a:avLst>
+              <a:gd name="adj1" fmla="val 35360"/>
+              <a:gd name="adj2" fmla="val 50513"/>
+            </a:avLst>
+          </a:prstGeom>
+          <a:ln w="38100"/>
+        </p:spPr>
+        <p:style>
+          <a:lnRef idx="1">
+            <a:schemeClr val="accent1"/>
+          </a:lnRef>
+          <a:fillRef idx="0">
+            <a:schemeClr val="accent1"/>
+          </a:fillRef>
+          <a:effectRef idx="0">
+            <a:schemeClr val="accent1"/>
+          </a:effectRef>
+          <a:fontRef idx="minor">
+            <a:schemeClr val="tx1"/>
+          </a:fontRef>
+        </p:style>
+        <p:txBody>
+          <a:bodyPr rtlCol="0" anchor="ctr"/>
+          <a:lstStyle/>
+          <a:p>
+            <a:pPr algn="ctr"/>
+            <a:endParaRPr lang="pt-BR"/>
           </a:p>
         </p:txBody>
       </p:sp>
     </p:spTree>
     <p:extLst>
       <p:ext uri="{BB962C8B-B14F-4D97-AF65-F5344CB8AC3E}">
-        <p14:creationId xmlns:p14="http://schemas.microsoft.com/office/powerpoint/2010/main" val="994685686"/>
+        <p14:creationId xmlns:p14="http://schemas.microsoft.com/office/powerpoint/2010/main" val="2487867869"/>
       </p:ext>
     </p:extLst>
   </p:cSld>
@@ -9279,7 +9505,6 @@
           <a:bodyPr/>
           <a:lstStyle/>
           <a:p>
-            <a:pPr algn="just"/>
             <a:r>
               <a:rPr lang="pt-BR" sz="3900" dirty="0" smtClean="0"/>
               <a:t>Declaração de variáveis e constantes</a:t>
@@ -9300,8 +9525,8 @@
         </p:nvSpPr>
         <p:spPr>
           <a:xfrm>
-            <a:off x="1103312" y="1514902"/>
-            <a:ext cx="10060557" cy="4733498"/>
+            <a:off x="1103312" y="2052918"/>
+            <a:ext cx="10005966" cy="4195481"/>
           </a:xfrm>
         </p:spPr>
         <p:txBody>
@@ -9311,263 +9536,38 @@
             <a:pPr algn="just"/>
             <a:r>
               <a:rPr lang="pt-BR" sz="1800" dirty="0" smtClean="0"/>
-              <a:t>Para definir uma variável, primeiro é preciso definir qual o </a:t>
-            </a:r>
-            <a:r>
-              <a:rPr lang="pt-BR" sz="1800" b="1" u="sng" dirty="0" smtClean="0"/>
-              <a:t>tipo de dado</a:t>
-            </a:r>
-            <a:r>
-              <a:rPr lang="pt-BR" sz="1800" b="1" dirty="0" smtClean="0"/>
-              <a:t> </a:t>
-            </a:r>
-            <a:r>
-              <a:rPr lang="pt-BR" sz="1800" dirty="0" smtClean="0"/>
-              <a:t>vai ser armazenado e um </a:t>
-            </a:r>
-            <a:r>
-              <a:rPr lang="pt-BR" sz="1800" b="1" u="sng" dirty="0" smtClean="0"/>
-              <a:t>nome para a variável</a:t>
-            </a:r>
-            <a:r>
-              <a:rPr lang="pt-BR" sz="1800" dirty="0" smtClean="0"/>
-              <a:t>, sempre seguindo aquelas regras de quais caracteres usar e não usar e números também</a:t>
-            </a:r>
-          </a:p>
-          <a:p>
-            <a:pPr lvl="1"/>
+              <a:t>Antes de escrevermos as variáveis e constantes é preciso entender a diferença entre uma e outra.</a:t>
+            </a:r>
+          </a:p>
+          <a:p>
+            <a:pPr algn="just"/>
+            <a:endParaRPr lang="pt-BR" dirty="0"/>
+          </a:p>
+          <a:p>
+            <a:pPr lvl="1" algn="just"/>
             <a:r>
               <a:rPr lang="pt-BR" dirty="0" smtClean="0"/>
-              <a:t>Exemplo: </a:t>
-            </a:r>
-            <a:r>
-              <a:rPr lang="pt-BR" sz="2400" b="1" dirty="0" smtClean="0"/>
-              <a:t>cadeia nome_funcionario</a:t>
-            </a:r>
-          </a:p>
-          <a:p>
-            <a:pPr marL="457200" lvl="1" indent="0">
-              <a:buNone/>
-            </a:pPr>
-            <a:endParaRPr lang="pt-BR" sz="2400" b="1" dirty="0"/>
-          </a:p>
-          <a:p>
-            <a:pPr marL="457200" lvl="1" indent="0">
-              <a:buNone/>
-            </a:pPr>
-            <a:r>
-              <a:rPr lang="pt-BR" sz="2400" b="1" dirty="0" smtClean="0"/>
-              <a:t>			   Tipo		Nome da variável</a:t>
-            </a:r>
-          </a:p>
-          <a:p>
-            <a:pPr algn="just"/>
-            <a:r>
-              <a:rPr lang="pt-BR" sz="1600" dirty="0" smtClean="0"/>
-              <a:t>Se houver mais de uma variável com o mesmo tipo de dado, podemos colocar uma virgula e escrever o nome das outras variáveis em seguida.</a:t>
-            </a:r>
-          </a:p>
-          <a:p>
-            <a:pPr lvl="1"/>
+              <a:t>Variáveis armazenam dados que podem sofrer alguma alteração durante na estrutura do código.</a:t>
+            </a:r>
+          </a:p>
+          <a:p>
+            <a:pPr lvl="1" algn="just"/>
+            <a:endParaRPr lang="pt-BR" dirty="0"/>
+          </a:p>
+          <a:p>
+            <a:pPr lvl="1" algn="just"/>
             <a:r>
               <a:rPr lang="pt-BR" dirty="0" smtClean="0"/>
-              <a:t>Exemplo: </a:t>
-            </a:r>
-            <a:r>
-              <a:rPr lang="pt-BR" sz="2400" b="1" dirty="0" smtClean="0"/>
-              <a:t>real nota1, nota2, nota3, media</a:t>
-            </a:r>
-          </a:p>
-          <a:p>
-            <a:pPr marL="457200" lvl="1" indent="0">
-              <a:buNone/>
-            </a:pPr>
-            <a:endParaRPr lang="pt-BR" sz="900" b="1" dirty="0" smtClean="0"/>
-          </a:p>
-          <a:p>
-            <a:pPr marL="457200" lvl="1" indent="0">
-              <a:buNone/>
-            </a:pPr>
-            <a:r>
-              <a:rPr lang="pt-BR" sz="2400" b="1" dirty="0" smtClean="0"/>
-              <a:t>			Tipo		Nome das variáveis</a:t>
+              <a:t>Constantes armazenam dados fixos, ou seja, esses dados não podem ser alterados estrutura do código.</a:t>
             </a:r>
             <a:endParaRPr lang="pt-BR" dirty="0"/>
-          </a:p>
-        </p:txBody>
-      </p:sp>
-      <p:sp>
-        <p:nvSpPr>
-          <p:cNvPr id="4" name="Chave Esquerda 3"/>
-          <p:cNvSpPr/>
-          <p:nvPr/>
-        </p:nvSpPr>
-        <p:spPr>
-          <a:xfrm rot="16200000">
-            <a:off x="3288309" y="2683419"/>
-            <a:ext cx="504967" cy="968992"/>
-          </a:xfrm>
-          <a:prstGeom prst="leftBrace">
-            <a:avLst>
-              <a:gd name="adj1" fmla="val 35360"/>
-              <a:gd name="adj2" fmla="val 50000"/>
-            </a:avLst>
-          </a:prstGeom>
-          <a:ln w="38100"/>
-        </p:spPr>
-        <p:style>
-          <a:lnRef idx="1">
-            <a:schemeClr val="accent2"/>
-          </a:lnRef>
-          <a:fillRef idx="0">
-            <a:schemeClr val="accent2"/>
-          </a:fillRef>
-          <a:effectRef idx="0">
-            <a:schemeClr val="accent2"/>
-          </a:effectRef>
-          <a:fontRef idx="minor">
-            <a:schemeClr val="tx1"/>
-          </a:fontRef>
-        </p:style>
-        <p:txBody>
-          <a:bodyPr rtlCol="0" anchor="ctr"/>
-          <a:lstStyle/>
-          <a:p>
-            <a:pPr algn="ctr"/>
-            <a:endParaRPr lang="pt-BR"/>
-          </a:p>
-        </p:txBody>
-      </p:sp>
-      <p:sp>
-        <p:nvSpPr>
-          <p:cNvPr id="5" name="Chave Esquerda 4"/>
-          <p:cNvSpPr/>
-          <p:nvPr/>
-        </p:nvSpPr>
-        <p:spPr>
-          <a:xfrm rot="16200000">
-            <a:off x="5247841" y="1838396"/>
-            <a:ext cx="504967" cy="2659039"/>
-          </a:xfrm>
-          <a:prstGeom prst="leftBrace">
-            <a:avLst>
-              <a:gd name="adj1" fmla="val 35360"/>
-              <a:gd name="adj2" fmla="val 50513"/>
-            </a:avLst>
-          </a:prstGeom>
-          <a:ln w="38100"/>
-        </p:spPr>
-        <p:style>
-          <a:lnRef idx="1">
-            <a:schemeClr val="accent1"/>
-          </a:lnRef>
-          <a:fillRef idx="0">
-            <a:schemeClr val="accent1"/>
-          </a:fillRef>
-          <a:effectRef idx="0">
-            <a:schemeClr val="accent1"/>
-          </a:effectRef>
-          <a:fontRef idx="minor">
-            <a:schemeClr val="tx1"/>
-          </a:fontRef>
-        </p:style>
-        <p:txBody>
-          <a:bodyPr rtlCol="0" anchor="ctr"/>
-          <a:lstStyle/>
-          <a:p>
-            <a:pPr algn="ctr"/>
-            <a:endParaRPr lang="pt-BR"/>
-          </a:p>
-        </p:txBody>
-      </p:sp>
-      <p:sp>
-        <p:nvSpPr>
-          <p:cNvPr id="6" name="Chave Esquerda 5"/>
-          <p:cNvSpPr/>
-          <p:nvPr/>
-        </p:nvSpPr>
-        <p:spPr>
-          <a:xfrm rot="16200000">
-            <a:off x="3153686" y="4838977"/>
-            <a:ext cx="316440" cy="592946"/>
-          </a:xfrm>
-          <a:prstGeom prst="leftBrace">
-            <a:avLst>
-              <a:gd name="adj1" fmla="val 35360"/>
-              <a:gd name="adj2" fmla="val 50000"/>
-            </a:avLst>
-          </a:prstGeom>
-          <a:ln w="38100"/>
-        </p:spPr>
-        <p:style>
-          <a:lnRef idx="1">
-            <a:schemeClr val="accent2"/>
-          </a:lnRef>
-          <a:fillRef idx="0">
-            <a:schemeClr val="accent2"/>
-          </a:fillRef>
-          <a:effectRef idx="0">
-            <a:schemeClr val="accent2"/>
-          </a:effectRef>
-          <a:fontRef idx="minor">
-            <a:schemeClr val="tx1"/>
-          </a:fontRef>
-        </p:style>
-        <p:txBody>
-          <a:bodyPr rtlCol="0" anchor="ctr"/>
-          <a:lstStyle/>
-          <a:p>
-            <a:pPr algn="ctr"/>
-            <a:endParaRPr lang="pt-BR"/>
-          </a:p>
-        </p:txBody>
-      </p:sp>
-      <p:sp>
-        <p:nvSpPr>
-          <p:cNvPr id="7" name="Chave Esquerda 6"/>
-          <p:cNvSpPr/>
-          <p:nvPr/>
-        </p:nvSpPr>
-        <p:spPr>
-          <a:xfrm rot="16200000">
-            <a:off x="5485375" y="3151148"/>
-            <a:ext cx="316441" cy="3968603"/>
-          </a:xfrm>
-          <a:prstGeom prst="leftBrace">
-            <a:avLst>
-              <a:gd name="adj1" fmla="val 35360"/>
-              <a:gd name="adj2" fmla="val 50513"/>
-            </a:avLst>
-          </a:prstGeom>
-          <a:ln w="38100"/>
-        </p:spPr>
-        <p:style>
-          <a:lnRef idx="1">
-            <a:schemeClr val="accent1"/>
-          </a:lnRef>
-          <a:fillRef idx="0">
-            <a:schemeClr val="accent1"/>
-          </a:fillRef>
-          <a:effectRef idx="0">
-            <a:schemeClr val="accent1"/>
-          </a:effectRef>
-          <a:fontRef idx="minor">
-            <a:schemeClr val="tx1"/>
-          </a:fontRef>
-        </p:style>
-        <p:txBody>
-          <a:bodyPr rtlCol="0" anchor="ctr"/>
-          <a:lstStyle/>
-          <a:p>
-            <a:pPr algn="ctr"/>
-            <a:endParaRPr lang="pt-BR"/>
           </a:p>
         </p:txBody>
       </p:sp>
     </p:spTree>
     <p:extLst>
       <p:ext uri="{BB962C8B-B14F-4D97-AF65-F5344CB8AC3E}">
-        <p14:creationId xmlns:p14="http://schemas.microsoft.com/office/powerpoint/2010/main" val="2487867869"/>
+        <p14:creationId xmlns:p14="http://schemas.microsoft.com/office/powerpoint/2010/main" val="994685686"/>
       </p:ext>
     </p:extLst>
   </p:cSld>

</xml_diff>